<commit_message>
Add demo video link and fix collection reset bug
</commit_message>
<xml_diff>
--- a/RAG_Chatbot_Presentation_Enhanced.pptx
+++ b/RAG_Chatbot_Presentation_Enhanced.pptx
@@ -3125,8 +3125,8 @@
         </p:nvSpPr>
         <p:spPr>
           <a:xfrm>
-            <a:off x="914400" y="1828800"/>
-            <a:ext cx="7315200" cy="1371600"/>
+            <a:off x="1583458" y="2231136"/>
+            <a:ext cx="5977085" cy="923330"/>
           </a:xfrm>
           <a:prstGeom prst="rect">
             <a:avLst/>
@@ -3147,43 +3147,17 @@
               </a:defRPr>
             </a:pPr>
             <a:r>
-              <a:t>RAG CHATBOT</a:t>
-            </a:r>
-          </a:p>
-        </p:txBody>
-      </p:sp>
-      <p:sp>
-        <p:nvSpPr>
-          <p:cNvPr id="3" name="TextBox 2"/>
-          <p:cNvSpPr txBox="1"/>
-          <p:nvPr/>
-        </p:nvSpPr>
-        <p:spPr>
-          <a:xfrm>
-            <a:off x="914400" y="3200400"/>
-            <a:ext cx="7315200" cy="914400"/>
-          </a:xfrm>
-          <a:prstGeom prst="rect">
-            <a:avLst/>
-          </a:prstGeom>
-          <a:noFill/>
-        </p:spPr>
-        <p:txBody>
-          <a:bodyPr wrap="none">
-            <a:spAutoFit/>
-          </a:bodyPr>
-          <a:lstStyle/>
-          <a:p>
-            <a:pPr algn="ctr">
-              <a:defRPr sz="2400">
-                <a:solidFill>
-                  <a:srgbClr val="FFFFFF"/>
-                </a:solidFill>
-              </a:defRPr>
-            </a:pPr>
-            <a:r>
-              <a:t>Q&amp;A System with ChromaDB &amp; Google Gemini</a:t>
-            </a:r>
+              <a:rPr dirty="0"/>
+              <a:t>RAG </a:t>
+            </a:r>
+            <a:r>
+              <a:rPr lang="en-IN"/>
+              <a:t> Q&amp;A </a:t>
+            </a:r>
+            <a:r>
+              <a:t>CHATBOT</a:t>
+            </a:r>
+            <a:endParaRPr dirty="0"/>
           </a:p>
         </p:txBody>
       </p:sp>
@@ -3217,6 +3191,7 @@
               </a:defRPr>
             </a:pPr>
             <a:r>
+              <a:rPr dirty="0"/>
               <a:t>Capstone Project | December 2025</a:t>
             </a:r>
           </a:p>

</xml_diff>